<commit_message>
minor corrections to one slide and one method
</commit_message>
<xml_diff>
--- a/PowerPoints/06 - Syntax Analysis.pptx
+++ b/PowerPoints/06 - Syntax Analysis.pptx
@@ -76,7 +76,7 @@
     <p:sldId id="382" r:id="rId64"/>
     <p:sldId id="394" r:id="rId65"/>
     <p:sldId id="395" r:id="rId66"/>
-    <p:sldId id="396" r:id="rId67"/>
+    <p:sldId id="417" r:id="rId67"/>
     <p:sldId id="397" r:id="rId68"/>
     <p:sldId id="328" r:id="rId69"/>
     <p:sldId id="336" r:id="rId70"/>
@@ -28487,7 +28487,7 @@
                 <a:latin typeface="Consolas" pitchFamily="49" charset="0"/>
                 <a:cs typeface="Consolas" pitchFamily="49" charset="0"/>
               </a:rPr>
-              <a:t>);</a:t>
+              <a:t>)</a:t>
             </a:r>
           </a:p>
           <a:p>
@@ -28498,11 +28498,18 @@
               <a:buNone/>
             </a:pPr>
             <a:r>
+              <a:rPr lang="en-US" sz="1750" dirty="0" err="1">
+                <a:latin typeface="Consolas" pitchFamily="49" charset="0"/>
+                <a:cs typeface="Consolas" pitchFamily="49" charset="0"/>
+              </a:rPr>
+              <a:t>val</a:t>
+            </a:r>
+            <a:r>
               <a:rPr lang="en-US" sz="1750" dirty="0">
                 <a:latin typeface="Consolas" pitchFamily="49" charset="0"/>
                 <a:cs typeface="Consolas" pitchFamily="49" charset="0"/>
               </a:rPr>
-              <a:t>Token </a:t>
+              <a:t> </a:t>
             </a:r>
             <a:r>
               <a:rPr lang="en-US" sz="1750" dirty="0" err="1">
@@ -28516,8 +28523,19 @@
                 <a:latin typeface="Consolas" pitchFamily="49" charset="0"/>
                 <a:cs typeface="Consolas" pitchFamily="49" charset="0"/>
               </a:rPr>
-              <a:t> = scanner.getToken();</a:t>
-            </a:r>
+              <a:t> = </a:t>
+            </a:r>
+            <a:r>
+              <a:rPr lang="en-US" sz="1750" dirty="0" err="1">
+                <a:latin typeface="Consolas" pitchFamily="49" charset="0"/>
+                <a:cs typeface="Consolas" pitchFamily="49" charset="0"/>
+              </a:rPr>
+              <a:t>scanner.token</a:t>
+            </a:r>
+            <a:endParaRPr lang="en-US" sz="1750" dirty="0">
+              <a:latin typeface="Consolas" pitchFamily="49" charset="0"/>
+              <a:cs typeface="Consolas" pitchFamily="49" charset="0"/>
+            </a:endParaRPr>
           </a:p>
           <a:p>
             <a:pPr marL="182880" indent="0">
@@ -28531,7 +28549,7 @@
                 <a:latin typeface="Consolas" pitchFamily="49" charset="0"/>
                 <a:cs typeface="Consolas" pitchFamily="49" charset="0"/>
               </a:rPr>
-              <a:t>match(Symbol.identifier);</a:t>
+              <a:t>match(Symbol.identifier)</a:t>
             </a:r>
           </a:p>
           <a:p>
@@ -28560,7 +28578,7 @@
                 <a:latin typeface="Consolas" pitchFamily="49" charset="0"/>
                 <a:cs typeface="Consolas" pitchFamily="49" charset="0"/>
               </a:rPr>
-              <a:t>, IdType.procedureId);</a:t>
+              <a:t>, IdType.procedureId)</a:t>
             </a:r>
           </a:p>
           <a:p>
@@ -28575,7 +28593,7 @@
                 <a:latin typeface="Consolas" pitchFamily="49" charset="0"/>
                 <a:cs typeface="Consolas" pitchFamily="49" charset="0"/>
               </a:rPr>
-              <a:t>match(Symbol.leftParen);</a:t>
+              <a:t>match(Symbol.leftParen)</a:t>
             </a:r>
           </a:p>
           <a:p>
@@ -28673,14 +28691,14 @@
                 <a:latin typeface="Consolas" pitchFamily="49" charset="0"/>
                 <a:cs typeface="Consolas" pitchFamily="49" charset="0"/>
               </a:rPr>
-              <a:t>    if (scanner.getSymbol().</a:t>
+              <a:t>    if (</a:t>
             </a:r>
             <a:r>
               <a:rPr lang="en-US" sz="1750" dirty="0" err="1">
                 <a:latin typeface="Consolas" pitchFamily="49" charset="0"/>
                 <a:cs typeface="Consolas" pitchFamily="49" charset="0"/>
               </a:rPr>
-              <a:t>isParameterDeclStarter</a:t>
+              <a:t>scanner.symbol.isParameterDeclStarter</a:t>
             </a:r>
             <a:r>
               <a:rPr lang="en-US" sz="1750" dirty="0">
@@ -28716,7 +28734,7 @@
                 <a:latin typeface="Consolas" pitchFamily="49" charset="0"/>
                 <a:cs typeface="Consolas" pitchFamily="49" charset="0"/>
               </a:rPr>
-              <a:t>();</a:t>
+              <a:t>()</a:t>
             </a:r>
           </a:p>
           <a:p>
@@ -28757,7 +28775,7 @@
                 <a:latin typeface="Consolas" pitchFamily="49" charset="0"/>
                 <a:cs typeface="Consolas" pitchFamily="49" charset="0"/>
               </a:rPr>
-              <a:t>);</a:t>
+              <a:t>)</a:t>
             </a:r>
           </a:p>
           <a:p>
@@ -28786,7 +28804,7 @@
                 <a:latin typeface="Consolas" pitchFamily="49" charset="0"/>
                 <a:cs typeface="Consolas" pitchFamily="49" charset="0"/>
               </a:rPr>
-              <a:t>);</a:t>
+              <a:t>)</a:t>
             </a:r>
           </a:p>
           <a:p>
@@ -28801,7 +28819,7 @@
                 <a:latin typeface="Consolas" pitchFamily="49" charset="0"/>
                 <a:cs typeface="Consolas" pitchFamily="49" charset="0"/>
               </a:rPr>
-              <a:t>    parseInitialDecls();</a:t>
+              <a:t>    parseInitialDecls()</a:t>
             </a:r>
           </a:p>
           <a:p>
@@ -28816,7 +28834,7 @@
                 <a:latin typeface="Consolas" pitchFamily="49" charset="0"/>
                 <a:cs typeface="Consolas" pitchFamily="49" charset="0"/>
               </a:rPr>
-              <a:t>    parseStatements();</a:t>
+              <a:t>    parseStatements()</a:t>
             </a:r>
           </a:p>
           <a:p>

</xml_diff>

<commit_message>
corrections to 2 PowerPoint slides
</commit_message>
<xml_diff>
--- a/PowerPoints/06 - Syntax Analysis.pptx
+++ b/PowerPoints/06 - Syntax Analysis.pptx
@@ -18806,7 +18806,7 @@
           <a:bodyPr/>
           <a:lstStyle/>
           <a:p>
-            <a:pPr marL="0" indent="0">
+            <a:pPr marL="182880" indent="0">
               <a:spcBef>
                 <a:spcPts val="0"/>
               </a:spcBef>
@@ -18816,20 +18816,194 @@
               <a:rPr lang="en-US" sz="1700" dirty="0">
                 <a:latin typeface="Consolas" panose="020B0609020204030204" pitchFamily="49" charset="0"/>
               </a:rPr>
-              <a:t>private void parseLoopStmt() throws </a:t>
+              <a:t>private fun </a:t>
             </a:r>
             <a:r>
               <a:rPr lang="en-US" sz="1700" dirty="0" err="1">
                 <a:latin typeface="Consolas" panose="020B0609020204030204" pitchFamily="49" charset="0"/>
               </a:rPr>
-              <a:t>IOException</a:t>
-            </a:r>
+              <a:t>parseLoopStmt</a:t>
+            </a:r>
+            <a:r>
+              <a:rPr lang="en-US" sz="1700" dirty="0">
+                <a:latin typeface="Consolas" panose="020B0609020204030204" pitchFamily="49" charset="0"/>
+              </a:rPr>
+              <a:t>()</a:t>
+            </a:r>
+          </a:p>
+          <a:p>
+            <a:pPr marL="182880" indent="0">
+              <a:spcBef>
+                <a:spcPts val="0"/>
+              </a:spcBef>
+              <a:buNone/>
+            </a:pPr>
+            <a:r>
+              <a:rPr lang="en-US" sz="1700" dirty="0">
+                <a:latin typeface="Consolas" panose="020B0609020204030204" pitchFamily="49" charset="0"/>
+              </a:rPr>
+              <a:t> {</a:t>
+            </a:r>
+          </a:p>
+          <a:p>
+            <a:pPr marL="182880" indent="0">
+              <a:spcBef>
+                <a:spcPts val="0"/>
+              </a:spcBef>
+              <a:buNone/>
+            </a:pPr>
+            <a:r>
+              <a:rPr lang="en-US" sz="1700" dirty="0">
+                <a:latin typeface="Consolas" panose="020B0609020204030204" pitchFamily="49" charset="0"/>
+              </a:rPr>
+              <a:t>   try</a:t>
+            </a:r>
+          </a:p>
+          <a:p>
+            <a:pPr marL="182880" indent="0">
+              <a:spcBef>
+                <a:spcPts val="0"/>
+              </a:spcBef>
+              <a:buNone/>
+            </a:pPr>
+            <a:r>
+              <a:rPr lang="en-US" sz="1700" dirty="0">
+                <a:latin typeface="Consolas" panose="020B0609020204030204" pitchFamily="49" charset="0"/>
+              </a:rPr>
+              <a:t>     {</a:t>
+            </a:r>
+          </a:p>
+          <a:p>
+            <a:pPr marL="182880" indent="0">
+              <a:spcBef>
+                <a:spcPts val="0"/>
+              </a:spcBef>
+              <a:buNone/>
+            </a:pPr>
+            <a:r>
+              <a:rPr lang="en-US" sz="1700" dirty="0">
+                <a:latin typeface="Consolas" panose="020B0609020204030204" pitchFamily="49" charset="0"/>
+              </a:rPr>
+              <a:t>       if (</a:t>
+            </a:r>
+            <a:r>
+              <a:rPr lang="en-US" sz="1700" dirty="0" err="1">
+                <a:latin typeface="Consolas" panose="020B0609020204030204" pitchFamily="49" charset="0"/>
+              </a:rPr>
+              <a:t>scanner.symbol</a:t>
+            </a:r>
+            <a:r>
+              <a:rPr lang="en-US" sz="1700" dirty="0">
+                <a:latin typeface="Consolas" panose="020B0609020204030204" pitchFamily="49" charset="0"/>
+              </a:rPr>
+              <a:t> == </a:t>
+            </a:r>
+            <a:r>
+              <a:rPr lang="en-US" sz="1700" dirty="0" err="1">
+                <a:latin typeface="Consolas" panose="020B0609020204030204" pitchFamily="49" charset="0"/>
+              </a:rPr>
+              <a:t>Symbol.whileRW</a:t>
+            </a:r>
+            <a:r>
+              <a:rPr lang="en-US" sz="1700" dirty="0">
+                <a:latin typeface="Consolas" panose="020B0609020204030204" pitchFamily="49" charset="0"/>
+              </a:rPr>
+              <a:t>)</a:t>
+            </a:r>
+          </a:p>
+          <a:p>
+            <a:pPr marL="182880" indent="0">
+              <a:spcBef>
+                <a:spcPts val="0"/>
+              </a:spcBef>
+              <a:buNone/>
+            </a:pPr>
+            <a:r>
+              <a:rPr lang="en-US" sz="1700" dirty="0">
+                <a:latin typeface="Consolas" panose="020B0609020204030204" pitchFamily="49" charset="0"/>
+              </a:rPr>
+              <a:t>         {</a:t>
+            </a:r>
+          </a:p>
+          <a:p>
+            <a:pPr marL="182880" indent="0">
+              <a:spcBef>
+                <a:spcPts val="0"/>
+              </a:spcBef>
+              <a:buNone/>
+            </a:pPr>
+            <a:r>
+              <a:rPr lang="en-US" sz="1700" dirty="0">
+                <a:latin typeface="Consolas" panose="020B0609020204030204" pitchFamily="49" charset="0"/>
+              </a:rPr>
+              <a:t>           </a:t>
+            </a:r>
+            <a:r>
+              <a:rPr lang="en-US" sz="1700" dirty="0" err="1">
+                <a:latin typeface="Consolas" panose="020B0609020204030204" pitchFamily="49" charset="0"/>
+              </a:rPr>
+              <a:t>matchCurrentSymbol</a:t>
+            </a:r>
+            <a:r>
+              <a:rPr lang="en-US" sz="1700" dirty="0">
+                <a:latin typeface="Consolas" panose="020B0609020204030204" pitchFamily="49" charset="0"/>
+              </a:rPr>
+              <a:t>()</a:t>
+            </a:r>
+          </a:p>
+          <a:p>
+            <a:pPr marL="182880" indent="0">
+              <a:spcBef>
+                <a:spcPts val="0"/>
+              </a:spcBef>
+              <a:buNone/>
+            </a:pPr>
+            <a:r>
+              <a:rPr lang="en-US" sz="1700" dirty="0">
+                <a:latin typeface="Consolas" panose="020B0609020204030204" pitchFamily="49" charset="0"/>
+              </a:rPr>
+              <a:t>           </a:t>
+            </a:r>
+            <a:r>
+              <a:rPr lang="en-US" sz="1700" dirty="0" err="1">
+                <a:latin typeface="Consolas" panose="020B0609020204030204" pitchFamily="49" charset="0"/>
+              </a:rPr>
+              <a:t>parseExpression</a:t>
+            </a:r>
+            <a:r>
+              <a:rPr lang="en-US" sz="1700" dirty="0">
+                <a:latin typeface="Consolas" panose="020B0609020204030204" pitchFamily="49" charset="0"/>
+              </a:rPr>
+              <a:t>()</a:t>
+            </a:r>
+          </a:p>
+          <a:p>
+            <a:pPr marL="182880" indent="0">
+              <a:spcBef>
+                <a:spcPts val="0"/>
+              </a:spcBef>
+              <a:buNone/>
+            </a:pPr>
+            <a:r>
+              <a:rPr lang="en-US" sz="1700" dirty="0">
+                <a:latin typeface="Consolas" panose="020B0609020204030204" pitchFamily="49" charset="0"/>
+              </a:rPr>
+              <a:t>         }</a:t>
+            </a:r>
+          </a:p>
+          <a:p>
+            <a:pPr marL="182880" indent="0">
+              <a:spcBef>
+                <a:spcPts val="0"/>
+              </a:spcBef>
+              <a:buNone/>
+            </a:pPr>
             <a:endParaRPr lang="en-US" sz="1700" dirty="0">
               <a:latin typeface="Consolas" panose="020B0609020204030204" pitchFamily="49" charset="0"/>
             </a:endParaRPr>
           </a:p>
           <a:p>
-            <a:pPr marL="0" indent="0">
+            <a:pPr marL="182880" indent="0">
               <a:spcBef>
                 <a:spcPts val="0"/>
               </a:spcBef>
@@ -18839,11 +19013,23 @@
               <a:rPr lang="en-US" sz="1700" dirty="0">
                 <a:latin typeface="Consolas" panose="020B0609020204030204" pitchFamily="49" charset="0"/>
               </a:rPr>
-              <a:t>  {</a:t>
-            </a:r>
-          </a:p>
-          <a:p>
-            <a:pPr marL="0" indent="0">
+              <a:t>       match(</a:t>
+            </a:r>
+            <a:r>
+              <a:rPr lang="en-US" sz="1700" dirty="0" err="1">
+                <a:latin typeface="Consolas" panose="020B0609020204030204" pitchFamily="49" charset="0"/>
+              </a:rPr>
+              <a:t>Symbol.loopRW</a:t>
+            </a:r>
+            <a:r>
+              <a:rPr lang="en-US" sz="1700" dirty="0">
+                <a:latin typeface="Consolas" panose="020B0609020204030204" pitchFamily="49" charset="0"/>
+              </a:rPr>
+              <a:t>)</a:t>
+            </a:r>
+          </a:p>
+          <a:p>
+            <a:pPr marL="182880" indent="0">
               <a:spcBef>
                 <a:spcPts val="0"/>
               </a:spcBef>
@@ -18853,11 +19039,23 @@
               <a:rPr lang="en-US" sz="1700" dirty="0">
                 <a:latin typeface="Consolas" panose="020B0609020204030204" pitchFamily="49" charset="0"/>
               </a:rPr>
-              <a:t>    try</a:t>
-            </a:r>
-          </a:p>
-          <a:p>
-            <a:pPr marL="0" indent="0">
+              <a:t>       </a:t>
+            </a:r>
+            <a:r>
+              <a:rPr lang="en-US" sz="1700" dirty="0" err="1">
+                <a:latin typeface="Consolas" panose="020B0609020204030204" pitchFamily="49" charset="0"/>
+              </a:rPr>
+              <a:t>parseStatement</a:t>
+            </a:r>
+            <a:r>
+              <a:rPr lang="en-US" sz="1700" dirty="0">
+                <a:latin typeface="Consolas" panose="020B0609020204030204" pitchFamily="49" charset="0"/>
+              </a:rPr>
+              <a:t>()</a:t>
+            </a:r>
+          </a:p>
+          <a:p>
+            <a:pPr marL="182880" indent="0">
               <a:spcBef>
                 <a:spcPts val="0"/>
               </a:spcBef>
@@ -18867,11 +19065,11 @@
               <a:rPr lang="en-US" sz="1700" dirty="0">
                 <a:latin typeface="Consolas" panose="020B0609020204030204" pitchFamily="49" charset="0"/>
               </a:rPr>
-              <a:t>      {</a:t>
-            </a:r>
-          </a:p>
-          <a:p>
-            <a:pPr marL="0" indent="0">
+              <a:t>     }</a:t>
+            </a:r>
+          </a:p>
+          <a:p>
+            <a:pPr marL="182880" indent="0">
               <a:spcBef>
                 <a:spcPts val="0"/>
               </a:spcBef>
@@ -18881,11 +19079,23 @@
               <a:rPr lang="en-US" sz="1700" dirty="0">
                 <a:latin typeface="Consolas" panose="020B0609020204030204" pitchFamily="49" charset="0"/>
               </a:rPr>
-              <a:t>        if (scanner.getSymbol() == Symbol.whileRW)</a:t>
-            </a:r>
-          </a:p>
-          <a:p>
-            <a:pPr marL="0" indent="0">
+              <a:t>   catch (e : </a:t>
+            </a:r>
+            <a:r>
+              <a:rPr lang="en-US" sz="1700" dirty="0" err="1">
+                <a:latin typeface="Consolas" panose="020B0609020204030204" pitchFamily="49" charset="0"/>
+              </a:rPr>
+              <a:t>ParserException</a:t>
+            </a:r>
+            <a:r>
+              <a:rPr lang="en-US" sz="1700" dirty="0">
+                <a:latin typeface="Consolas" panose="020B0609020204030204" pitchFamily="49" charset="0"/>
+              </a:rPr>
+              <a:t>)</a:t>
+            </a:r>
+          </a:p>
+          <a:p>
+            <a:pPr marL="182880" indent="0">
               <a:spcBef>
                 <a:spcPts val="0"/>
               </a:spcBef>
@@ -18895,11 +19105,11 @@
               <a:rPr lang="en-US" sz="1700" dirty="0">
                 <a:latin typeface="Consolas" panose="020B0609020204030204" pitchFamily="49" charset="0"/>
               </a:rPr>
-              <a:t>          {</a:t>
-            </a:r>
-          </a:p>
-          <a:p>
-            <a:pPr marL="0" indent="0">
+              <a:t>     {</a:t>
+            </a:r>
+          </a:p>
+          <a:p>
+            <a:pPr marL="182880" indent="0">
               <a:spcBef>
                 <a:spcPts val="0"/>
               </a:spcBef>
@@ -18909,11 +19119,23 @@
               <a:rPr lang="en-US" sz="1700" dirty="0">
                 <a:latin typeface="Consolas" panose="020B0609020204030204" pitchFamily="49" charset="0"/>
               </a:rPr>
-              <a:t>            matchCurrentSymbol();</a:t>
-            </a:r>
-          </a:p>
-          <a:p>
-            <a:pPr marL="0" indent="0">
+              <a:t>       </a:t>
+            </a:r>
+            <a:r>
+              <a:rPr lang="en-US" sz="1700" dirty="0" err="1">
+                <a:latin typeface="Consolas" panose="020B0609020204030204" pitchFamily="49" charset="0"/>
+              </a:rPr>
+              <a:t>errorHandler.reportError</a:t>
+            </a:r>
+            <a:r>
+              <a:rPr lang="en-US" sz="1700" dirty="0">
+                <a:latin typeface="Consolas" panose="020B0609020204030204" pitchFamily="49" charset="0"/>
+              </a:rPr>
+              <a:t>(e)</a:t>
+            </a:r>
+          </a:p>
+          <a:p>
+            <a:pPr marL="182880" indent="0">
               <a:spcBef>
                 <a:spcPts val="0"/>
               </a:spcBef>
@@ -18923,23 +19145,23 @@
               <a:rPr lang="en-US" sz="1700" dirty="0">
                 <a:latin typeface="Consolas" panose="020B0609020204030204" pitchFamily="49" charset="0"/>
               </a:rPr>
-              <a:t>            </a:t>
+              <a:t>       recover(</a:t>
             </a:r>
             <a:r>
               <a:rPr lang="en-US" sz="1700" dirty="0" err="1">
                 <a:latin typeface="Consolas" panose="020B0609020204030204" pitchFamily="49" charset="0"/>
               </a:rPr>
-              <a:t>parseExpression</a:t>
+              <a:t>emptySet</a:t>
             </a:r>
             <a:r>
               <a:rPr lang="en-US" sz="1700" dirty="0">
                 <a:latin typeface="Consolas" panose="020B0609020204030204" pitchFamily="49" charset="0"/>
               </a:rPr>
-              <a:t>();</a:t>
-            </a:r>
-          </a:p>
-          <a:p>
-            <a:pPr marL="0" indent="0">
+              <a:t>)</a:t>
+            </a:r>
+          </a:p>
+          <a:p>
+            <a:pPr marL="182880" indent="0">
               <a:spcBef>
                 <a:spcPts val="0"/>
               </a:spcBef>
@@ -18949,180 +19171,21 @@
               <a:rPr lang="en-US" sz="1700" dirty="0">
                 <a:latin typeface="Consolas" panose="020B0609020204030204" pitchFamily="49" charset="0"/>
               </a:rPr>
-              <a:t>          }</a:t>
-            </a:r>
-          </a:p>
-          <a:p>
-            <a:pPr marL="0" indent="0">
+              <a:t>     }</a:t>
+            </a:r>
+          </a:p>
+          <a:p>
+            <a:pPr marL="182880" indent="0">
               <a:spcBef>
                 <a:spcPts val="0"/>
               </a:spcBef>
               <a:buNone/>
             </a:pPr>
-            <a:endParaRPr lang="en-US" sz="1700" dirty="0">
-              <a:latin typeface="Consolas" panose="020B0609020204030204" pitchFamily="49" charset="0"/>
-            </a:endParaRPr>
-          </a:p>
-          <a:p>
-            <a:pPr marL="0" indent="0">
-              <a:spcBef>
-                <a:spcPts val="0"/>
-              </a:spcBef>
-              <a:buNone/>
-            </a:pPr>
             <a:r>
               <a:rPr lang="en-US" sz="1700" dirty="0">
                 <a:latin typeface="Consolas" panose="020B0609020204030204" pitchFamily="49" charset="0"/>
               </a:rPr>
-              <a:t>        match(Symbol.loopRW);</a:t>
-            </a:r>
-          </a:p>
-          <a:p>
-            <a:pPr marL="0" indent="0">
-              <a:spcBef>
-                <a:spcPts val="0"/>
-              </a:spcBef>
-              <a:buNone/>
-            </a:pPr>
-            <a:r>
-              <a:rPr lang="en-US" sz="1700" dirty="0">
-                <a:latin typeface="Consolas" panose="020B0609020204030204" pitchFamily="49" charset="0"/>
-              </a:rPr>
-              <a:t>        parseStatement();</a:t>
-            </a:r>
-          </a:p>
-          <a:p>
-            <a:pPr marL="0" indent="0">
-              <a:spcBef>
-                <a:spcPts val="0"/>
-              </a:spcBef>
-              <a:buNone/>
-            </a:pPr>
-            <a:r>
-              <a:rPr lang="en-US" sz="1700" dirty="0">
-                <a:latin typeface="Consolas" panose="020B0609020204030204" pitchFamily="49" charset="0"/>
-              </a:rPr>
-              <a:t>      }</a:t>
-            </a:r>
-          </a:p>
-          <a:p>
-            <a:pPr marL="0" indent="0">
-              <a:spcBef>
-                <a:spcPts val="0"/>
-              </a:spcBef>
-              <a:buNone/>
-            </a:pPr>
-            <a:r>
-              <a:rPr lang="en-US" sz="1700" dirty="0">
-                <a:latin typeface="Consolas" panose="020B0609020204030204" pitchFamily="49" charset="0"/>
-              </a:rPr>
-              <a:t>    catch (</a:t>
-            </a:r>
-            <a:r>
-              <a:rPr lang="en-US" sz="1700" dirty="0" err="1">
-                <a:latin typeface="Consolas" panose="020B0609020204030204" pitchFamily="49" charset="0"/>
-              </a:rPr>
-              <a:t>ParserException</a:t>
-            </a:r>
-            <a:r>
-              <a:rPr lang="en-US" sz="1700" dirty="0">
-                <a:latin typeface="Consolas" panose="020B0609020204030204" pitchFamily="49" charset="0"/>
-              </a:rPr>
-              <a:t> e)</a:t>
-            </a:r>
-          </a:p>
-          <a:p>
-            <a:pPr marL="0" indent="0">
-              <a:spcBef>
-                <a:spcPts val="0"/>
-              </a:spcBef>
-              <a:buNone/>
-            </a:pPr>
-            <a:r>
-              <a:rPr lang="en-US" sz="1700" dirty="0">
-                <a:latin typeface="Consolas" panose="020B0609020204030204" pitchFamily="49" charset="0"/>
-              </a:rPr>
-              <a:t>      {</a:t>
-            </a:r>
-          </a:p>
-          <a:p>
-            <a:pPr marL="0" indent="0">
-              <a:spcBef>
-                <a:spcPts val="0"/>
-              </a:spcBef>
-              <a:buNone/>
-            </a:pPr>
-            <a:r>
-              <a:rPr lang="en-US" sz="1700" dirty="0">
-                <a:latin typeface="Consolas" panose="020B0609020204030204" pitchFamily="49" charset="0"/>
-              </a:rPr>
-              <a:t>        </a:t>
-            </a:r>
-            <a:r>
-              <a:rPr lang="en-US" sz="1700" dirty="0" err="1">
-                <a:latin typeface="Consolas" panose="020B0609020204030204" pitchFamily="49" charset="0"/>
-              </a:rPr>
-              <a:t>errorHandler.reportError</a:t>
-            </a:r>
-            <a:r>
-              <a:rPr lang="en-US" sz="1700" dirty="0">
-                <a:latin typeface="Consolas" panose="020B0609020204030204" pitchFamily="49" charset="0"/>
-              </a:rPr>
-              <a:t>(e);</a:t>
-            </a:r>
-          </a:p>
-          <a:p>
-            <a:pPr marL="0" indent="0">
-              <a:spcBef>
-                <a:spcPts val="0"/>
-              </a:spcBef>
-              <a:buNone/>
-            </a:pPr>
-            <a:r>
-              <a:rPr lang="en-US" sz="1700" dirty="0">
-                <a:latin typeface="Consolas" panose="020B0609020204030204" pitchFamily="49" charset="0"/>
-              </a:rPr>
-              <a:t>        recover(</a:t>
-            </a:r>
-            <a:r>
-              <a:rPr lang="en-US" sz="1700" dirty="0" err="1">
-                <a:latin typeface="Consolas" panose="020B0609020204030204" pitchFamily="49" charset="0"/>
-              </a:rPr>
-              <a:t>emptySet</a:t>
-            </a:r>
-            <a:r>
-              <a:rPr lang="en-US" sz="1700" dirty="0">
-                <a:latin typeface="Consolas" panose="020B0609020204030204" pitchFamily="49" charset="0"/>
-              </a:rPr>
-              <a:t>);</a:t>
-            </a:r>
-          </a:p>
-          <a:p>
-            <a:pPr marL="0" indent="0">
-              <a:spcBef>
-                <a:spcPts val="0"/>
-              </a:spcBef>
-              <a:buNone/>
-            </a:pPr>
-            <a:r>
-              <a:rPr lang="en-US" sz="1700" dirty="0">
-                <a:latin typeface="Consolas" panose="020B0609020204030204" pitchFamily="49" charset="0"/>
-              </a:rPr>
-              <a:t>      }</a:t>
-            </a:r>
-          </a:p>
-          <a:p>
-            <a:pPr marL="0" indent="0">
-              <a:spcBef>
-                <a:spcPts val="0"/>
-              </a:spcBef>
-              <a:buNone/>
-            </a:pPr>
-            <a:r>
-              <a:rPr lang="en-US" sz="1700" dirty="0">
-                <a:latin typeface="Consolas" panose="020B0609020204030204" pitchFamily="49" charset="0"/>
-              </a:rPr>
-              <a:t>  }</a:t>
+              <a:t> }</a:t>
             </a:r>
           </a:p>
         </p:txBody>
@@ -28094,19 +28157,19 @@
               <a:rPr lang="en-US" sz="1800" b="1" dirty="0">
                 <a:latin typeface="Consolas" panose="020B0609020204030204" pitchFamily="49" charset="0"/>
               </a:rPr>
-              <a:t>(2).</a:t>
-            </a:r>
-            <a:r>
-              <a:rPr lang="en-US" sz="1800" b="1" dirty="0" err="1">
-                <a:latin typeface="Consolas" panose="020B0609020204030204" pitchFamily="49" charset="0"/>
-              </a:rPr>
-              <a:t>getSymbol</a:t>
+              <a:t>(</a:t>
+            </a:r>
+            <a:r>
+              <a:rPr lang="en-US" sz="1800" b="1">
+                <a:latin typeface="Consolas" panose="020B0609020204030204" pitchFamily="49" charset="0"/>
+              </a:rPr>
+              <a:t>2).symbol </a:t>
             </a:r>
             <a:r>
               <a:rPr lang="en-US" sz="1800" b="1" dirty="0">
                 <a:latin typeface="Consolas" panose="020B0609020204030204" pitchFamily="49" charset="0"/>
               </a:rPr>
-              <a:t>() == Symbol.leftParen)</a:t>
+              <a:t>== Symbol.leftParen)</a:t>
             </a:r>
           </a:p>
           <a:p>

</xml_diff>